<commit_message>
Se suben carpetas de trabajo para usuarios
</commit_message>
<xml_diff>
--- a/PDFs-Manuales/Spring Boot.pptx
+++ b/PDFs-Manuales/Spring Boot.pptx
@@ -253,7 +253,7 @@
           <a:p>
             <a:fld id="{1A4277B1-5A35-4015-ADFA-1027FE43420A}" type="datetimeFigureOut">
               <a:rPr lang="en-IN" smtClean="0"/>
-              <a:t>24-09-2020</a:t>
+              <a:t>12-10-2020</a:t>
             </a:fld>
             <a:endParaRPr lang="en-IN" dirty="0"/>
           </a:p>
@@ -418,7 +418,7 @@
           <a:p>
             <a:fld id="{B2E8E90A-A117-4108-9773-3B07C8C5010A}" type="datetimeFigureOut">
               <a:rPr lang="en-IN" smtClean="0"/>
-              <a:t>24-09-2020</a:t>
+              <a:t>12-10-2020</a:t>
             </a:fld>
             <a:endParaRPr lang="en-IN" dirty="0"/>
           </a:p>
@@ -7796,7 +7796,7 @@
               <a:t> </a:t>
             </a:r>
             <a:r>
-              <a:rPr lang="es-MX" sz="1600" dirty="0" err="1" smtClean="0">
+              <a:rPr lang="es-MX" sz="1600" dirty="0" smtClean="0">
                 <a:solidFill>
                   <a:prstClr val="white">
                     <a:lumMod val="95000"/>
@@ -7805,7 +7805,7 @@
                 <a:latin typeface="Arial" panose="020B0604020202020204" pitchFamily="34" charset="0"/>
                 <a:cs typeface="Arial" panose="020B0604020202020204" pitchFamily="34" charset="0"/>
               </a:rPr>
-              <a:t>Introduccion</a:t>
+              <a:t>Introducción</a:t>
             </a:r>
             <a:endParaRPr lang="es-MX" sz="1600" dirty="0" smtClean="0">
               <a:solidFill>
@@ -7837,21 +7837,13 @@
               </a:rPr>
               <a:t>Spring MVC (Introducción)</a:t>
             </a:r>
-            <a:endParaRPr lang="es-MX" sz="1600" dirty="0" smtClean="0">
-              <a:solidFill>
-                <a:prstClr val="white">
-                  <a:lumMod val="95000"/>
-                </a:prstClr>
-              </a:solidFill>
-              <a:latin typeface="Arial" panose="020B0604020202020204" pitchFamily="34" charset="0"/>
-              <a:cs typeface="Arial" panose="020B0604020202020204" pitchFamily="34" charset="0"/>
-            </a:endParaRPr>
-          </a:p>
-          <a:p>
-            <a:pPr algn="just">
+          </a:p>
+          <a:p>
+            <a:pPr marL="342900" indent="-342900" algn="just">
               <a:lnSpc>
                 <a:spcPct val="150000"/>
               </a:lnSpc>
+              <a:buAutoNum type="arabicPeriod" startAt="3"/>
             </a:pPr>
             <a:r>
               <a:rPr lang="es-MX" sz="1600" dirty="0" smtClean="0">
@@ -7863,26 +7855,8 @@
                 <a:latin typeface="Arial" panose="020B0604020202020204" pitchFamily="34" charset="0"/>
                 <a:cs typeface="Arial" panose="020B0604020202020204" pitchFamily="34" charset="0"/>
               </a:rPr>
-              <a:t>3.   Spring MVC (Controladores)</a:t>
-            </a:r>
-            <a:endParaRPr lang="es-MX" sz="1600" dirty="0" smtClean="0">
-              <a:solidFill>
-                <a:prstClr val="white">
-                  <a:lumMod val="95000"/>
-                </a:prstClr>
-              </a:solidFill>
-              <a:latin typeface="Arial" panose="020B0604020202020204" pitchFamily="34" charset="0"/>
-              <a:cs typeface="Arial" panose="020B0604020202020204" pitchFamily="34" charset="0"/>
-            </a:endParaRPr>
-          </a:p>
-          <a:p>
-            <a:pPr marL="342900" indent="-342900" algn="just">
-              <a:lnSpc>
-                <a:spcPct val="150000"/>
-              </a:lnSpc>
-              <a:buFont typeface="+mj-lt"/>
-              <a:buAutoNum type="arabicPeriod"/>
-            </a:pPr>
+              <a:t>Spring </a:t>
+            </a:r>
             <a:r>
               <a:rPr lang="es-MX" sz="1600" dirty="0" smtClean="0">
                 <a:solidFill>
@@ -7893,49 +7867,7 @@
                 <a:latin typeface="Arial" panose="020B0604020202020204" pitchFamily="34" charset="0"/>
                 <a:cs typeface="Arial" panose="020B0604020202020204" pitchFamily="34" charset="0"/>
               </a:rPr>
-              <a:t>Spring MVC (Inyección de dependencia)</a:t>
-            </a:r>
-            <a:endParaRPr lang="es-MX" sz="1600" dirty="0" smtClean="0">
-              <a:solidFill>
-                <a:prstClr val="white">
-                  <a:lumMod val="95000"/>
-                </a:prstClr>
-              </a:solidFill>
-              <a:latin typeface="Arial" panose="020B0604020202020204" pitchFamily="34" charset="0"/>
-              <a:cs typeface="Arial" panose="020B0604020202020204" pitchFamily="34" charset="0"/>
-            </a:endParaRPr>
-          </a:p>
-          <a:p>
-            <a:pPr marL="342900" indent="-342900" algn="just">
-              <a:lnSpc>
-                <a:spcPct val="150000"/>
-              </a:lnSpc>
-              <a:buFont typeface="+mj-lt"/>
-              <a:buAutoNum type="arabicPeriod"/>
-            </a:pPr>
-            <a:r>
-              <a:rPr lang="es-MX" sz="1600" dirty="0" smtClean="0">
-                <a:solidFill>
-                  <a:prstClr val="white">
-                    <a:lumMod val="95000"/>
-                  </a:prstClr>
-                </a:solidFill>
-                <a:latin typeface="Arial" panose="020B0604020202020204" pitchFamily="34" charset="0"/>
-                <a:cs typeface="Arial" panose="020B0604020202020204" pitchFamily="34" charset="0"/>
-              </a:rPr>
-              <a:t>Spring MVC (</a:t>
-            </a:r>
-            <a:r>
-              <a:rPr lang="es-MX" sz="1600" dirty="0" err="1" smtClean="0">
-                <a:solidFill>
-                  <a:prstClr val="white">
-                    <a:lumMod val="95000"/>
-                  </a:prstClr>
-                </a:solidFill>
-                <a:latin typeface="Arial" panose="020B0604020202020204" pitchFamily="34" charset="0"/>
-                <a:cs typeface="Arial" panose="020B0604020202020204" pitchFamily="34" charset="0"/>
-              </a:rPr>
-              <a:t>Thymeleaft</a:t>
+              <a:t>MVC (Controladores</a:t>
             </a:r>
             <a:r>
               <a:rPr lang="es-MX" sz="1600" dirty="0" smtClean="0">
@@ -7949,6 +7881,105 @@
               </a:rPr>
               <a:t>)</a:t>
             </a:r>
+          </a:p>
+          <a:p>
+            <a:pPr marL="342900" indent="-342900" algn="just">
+              <a:lnSpc>
+                <a:spcPct val="150000"/>
+              </a:lnSpc>
+              <a:buFontTx/>
+              <a:buAutoNum type="arabicPeriod" startAt="3"/>
+            </a:pPr>
+            <a:r>
+              <a:rPr lang="es-MX" sz="1600" dirty="0">
+                <a:solidFill>
+                  <a:prstClr val="white">
+                    <a:lumMod val="95000"/>
+                  </a:prstClr>
+                </a:solidFill>
+                <a:latin typeface="Arial" panose="020B0604020202020204" pitchFamily="34" charset="0"/>
+                <a:cs typeface="Arial" panose="020B0604020202020204" pitchFamily="34" charset="0"/>
+              </a:rPr>
+              <a:t>Spring MVC (Inyección de dependencia)</a:t>
+            </a:r>
+          </a:p>
+          <a:p>
+            <a:pPr marL="342900" indent="-342900" algn="just">
+              <a:lnSpc>
+                <a:spcPct val="150000"/>
+              </a:lnSpc>
+              <a:buFontTx/>
+              <a:buAutoNum type="arabicPeriod" startAt="3"/>
+            </a:pPr>
+            <a:r>
+              <a:rPr lang="es-MX" sz="1600" dirty="0">
+                <a:solidFill>
+                  <a:prstClr val="white">
+                    <a:lumMod val="95000"/>
+                  </a:prstClr>
+                </a:solidFill>
+                <a:latin typeface="Arial" panose="020B0604020202020204" pitchFamily="34" charset="0"/>
+                <a:cs typeface="Arial" panose="020B0604020202020204" pitchFamily="34" charset="0"/>
+              </a:rPr>
+              <a:t>Spring MVC (</a:t>
+            </a:r>
+            <a:r>
+              <a:rPr lang="es-MX" sz="1600" dirty="0">
+                <a:solidFill>
+                  <a:prstClr val="white">
+                    <a:lumMod val="95000"/>
+                  </a:prstClr>
+                </a:solidFill>
+                <a:latin typeface="Arial" panose="020B0604020202020204" pitchFamily="34" charset="0"/>
+                <a:cs typeface="Arial" panose="020B0604020202020204" pitchFamily="34" charset="0"/>
+              </a:rPr>
+              <a:t>Thymeleaft</a:t>
+            </a:r>
+            <a:r>
+              <a:rPr lang="es-MX" sz="1600" dirty="0">
+                <a:solidFill>
+                  <a:prstClr val="white">
+                    <a:lumMod val="95000"/>
+                  </a:prstClr>
+                </a:solidFill>
+                <a:latin typeface="Arial" panose="020B0604020202020204" pitchFamily="34" charset="0"/>
+                <a:cs typeface="Arial" panose="020B0604020202020204" pitchFamily="34" charset="0"/>
+              </a:rPr>
+              <a:t>)</a:t>
+            </a:r>
+          </a:p>
+          <a:p>
+            <a:pPr marL="342900" indent="-342900" algn="just">
+              <a:lnSpc>
+                <a:spcPct val="150000"/>
+              </a:lnSpc>
+              <a:buFontTx/>
+              <a:buAutoNum type="arabicPeriod" startAt="3"/>
+            </a:pPr>
+            <a:r>
+              <a:rPr lang="es-MX" sz="1600" dirty="0">
+                <a:solidFill>
+                  <a:prstClr val="white">
+                    <a:lumMod val="95000"/>
+                  </a:prstClr>
+                </a:solidFill>
+                <a:latin typeface="Arial" panose="020B0604020202020204" pitchFamily="34" charset="0"/>
+                <a:cs typeface="Arial" panose="020B0604020202020204" pitchFamily="34" charset="0"/>
+              </a:rPr>
+              <a:t>Formulario HTML y Data </a:t>
+            </a:r>
+            <a:r>
+              <a:rPr lang="es-MX" sz="1600" dirty="0" smtClean="0">
+                <a:solidFill>
+                  <a:prstClr val="white">
+                    <a:lumMod val="95000"/>
+                  </a:prstClr>
+                </a:solidFill>
+                <a:latin typeface="Arial" panose="020B0604020202020204" pitchFamily="34" charset="0"/>
+                <a:cs typeface="Arial" panose="020B0604020202020204" pitchFamily="34" charset="0"/>
+              </a:rPr>
+              <a:t>Binding</a:t>
+            </a:r>
             <a:endParaRPr lang="es-MX" sz="1600" dirty="0" smtClean="0">
               <a:solidFill>
                 <a:prstClr val="white">
@@ -7964,8 +7995,8 @@
               <a:lnSpc>
                 <a:spcPct val="150000"/>
               </a:lnSpc>
-              <a:buFont typeface="+mj-lt"/>
-              <a:buAutoNum type="arabicPeriod"/>
+              <a:buFontTx/>
+              <a:buAutoNum type="arabicPeriod" startAt="3"/>
             </a:pPr>
             <a:r>
               <a:rPr lang="es-MX" sz="1600" dirty="0" smtClean="0">
@@ -7977,10 +8008,10 @@
                 <a:latin typeface="Arial" panose="020B0604020202020204" pitchFamily="34" charset="0"/>
                 <a:cs typeface="Arial" panose="020B0604020202020204" pitchFamily="34" charset="0"/>
               </a:rPr>
-              <a:t>Formulario HTML y Data </a:t>
-            </a:r>
-            <a:r>
-              <a:rPr lang="es-MX" sz="1600" dirty="0" err="1" smtClean="0">
+              <a:t>Upload</a:t>
+            </a:r>
+            <a:r>
+              <a:rPr lang="es-MX" sz="1600" dirty="0" smtClean="0">
                 <a:solidFill>
                   <a:prstClr val="white">
                     <a:lumMod val="95000"/>
@@ -7989,8 +8020,196 @@
                 <a:latin typeface="Arial" panose="020B0604020202020204" pitchFamily="34" charset="0"/>
                 <a:cs typeface="Arial" panose="020B0604020202020204" pitchFamily="34" charset="0"/>
               </a:rPr>
-              <a:t>Binding</a:t>
-            </a:r>
+              <a:t> Files</a:t>
+            </a:r>
+          </a:p>
+          <a:p>
+            <a:pPr marL="342900" indent="-342900" algn="just">
+              <a:lnSpc>
+                <a:spcPct val="150000"/>
+              </a:lnSpc>
+              <a:buFontTx/>
+              <a:buAutoNum type="arabicPeriod" startAt="3"/>
+            </a:pPr>
+            <a:r>
+              <a:rPr lang="es-MX" sz="1600" dirty="0" smtClean="0">
+                <a:solidFill>
+                  <a:prstClr val="white">
+                    <a:lumMod val="95000"/>
+                  </a:prstClr>
+                </a:solidFill>
+                <a:latin typeface="Arial" panose="020B0604020202020204" pitchFamily="34" charset="0"/>
+                <a:cs typeface="Arial" panose="020B0604020202020204" pitchFamily="34" charset="0"/>
+              </a:rPr>
+              <a:t>SpringData</a:t>
+            </a:r>
+            <a:r>
+              <a:rPr lang="es-MX" sz="1600" dirty="0" smtClean="0">
+                <a:solidFill>
+                  <a:prstClr val="white">
+                    <a:lumMod val="95000"/>
+                  </a:prstClr>
+                </a:solidFill>
+                <a:latin typeface="Arial" panose="020B0604020202020204" pitchFamily="34" charset="0"/>
+                <a:cs typeface="Arial" panose="020B0604020202020204" pitchFamily="34" charset="0"/>
+              </a:rPr>
+              <a:t> JPA</a:t>
+            </a:r>
+          </a:p>
+          <a:p>
+            <a:pPr marL="342900" indent="-342900" algn="just">
+              <a:lnSpc>
+                <a:spcPct val="150000"/>
+              </a:lnSpc>
+              <a:buFontTx/>
+              <a:buAutoNum type="arabicPeriod" startAt="3"/>
+            </a:pPr>
+            <a:r>
+              <a:rPr lang="es-MX" sz="1600" dirty="0" smtClean="0">
+                <a:solidFill>
+                  <a:prstClr val="white">
+                    <a:lumMod val="95000"/>
+                  </a:prstClr>
+                </a:solidFill>
+                <a:latin typeface="Arial" panose="020B0604020202020204" pitchFamily="34" charset="0"/>
+                <a:cs typeface="Arial" panose="020B0604020202020204" pitchFamily="34" charset="0"/>
+              </a:rPr>
+              <a:t>Spring Security</a:t>
+            </a:r>
+          </a:p>
+          <a:p>
+            <a:pPr marL="342900" indent="-342900" algn="just">
+              <a:lnSpc>
+                <a:spcPct val="150000"/>
+              </a:lnSpc>
+              <a:buFontTx/>
+              <a:buAutoNum type="arabicPeriod" startAt="3"/>
+            </a:pPr>
+            <a:r>
+              <a:rPr lang="es-MX" sz="1600" dirty="0" smtClean="0">
+                <a:solidFill>
+                  <a:prstClr val="white">
+                    <a:lumMod val="95000"/>
+                  </a:prstClr>
+                </a:solidFill>
+                <a:latin typeface="Arial" panose="020B0604020202020204" pitchFamily="34" charset="0"/>
+                <a:cs typeface="Arial" panose="020B0604020202020204" pitchFamily="34" charset="0"/>
+              </a:rPr>
+              <a:t>Spring </a:t>
+            </a:r>
+            <a:r>
+              <a:rPr lang="es-MX" sz="1600" dirty="0" smtClean="0">
+                <a:solidFill>
+                  <a:prstClr val="white">
+                    <a:lumMod val="95000"/>
+                  </a:prstClr>
+                </a:solidFill>
+                <a:latin typeface="Arial" panose="020B0604020202020204" pitchFamily="34" charset="0"/>
+                <a:cs typeface="Arial" panose="020B0604020202020204" pitchFamily="34" charset="0"/>
+              </a:rPr>
+              <a:t>Boot</a:t>
+            </a:r>
+            <a:r>
+              <a:rPr lang="es-MX" sz="1600" dirty="0" smtClean="0">
+                <a:solidFill>
+                  <a:prstClr val="white">
+                    <a:lumMod val="95000"/>
+                  </a:prstClr>
+                </a:solidFill>
+                <a:latin typeface="Arial" panose="020B0604020202020204" pitchFamily="34" charset="0"/>
+                <a:cs typeface="Arial" panose="020B0604020202020204" pitchFamily="34" charset="0"/>
+              </a:rPr>
+              <a:t> (</a:t>
+            </a:r>
+            <a:r>
+              <a:rPr lang="es-MX" sz="1600" dirty="0" smtClean="0">
+                <a:solidFill>
+                  <a:prstClr val="white">
+                    <a:lumMod val="95000"/>
+                  </a:prstClr>
+                </a:solidFill>
+                <a:latin typeface="Arial" panose="020B0604020202020204" pitchFamily="34" charset="0"/>
+                <a:cs typeface="Arial" panose="020B0604020202020204" pitchFamily="34" charset="0"/>
+              </a:rPr>
+              <a:t>Rest</a:t>
+            </a:r>
+            <a:r>
+              <a:rPr lang="es-MX" sz="1600" dirty="0" smtClean="0">
+                <a:solidFill>
+                  <a:prstClr val="white">
+                    <a:lumMod val="95000"/>
+                  </a:prstClr>
+                </a:solidFill>
+                <a:latin typeface="Arial" panose="020B0604020202020204" pitchFamily="34" charset="0"/>
+                <a:cs typeface="Arial" panose="020B0604020202020204" pitchFamily="34" charset="0"/>
+              </a:rPr>
+              <a:t> </a:t>
+            </a:r>
+            <a:r>
+              <a:rPr lang="es-MX" sz="1600" dirty="0" smtClean="0">
+                <a:solidFill>
+                  <a:prstClr val="white">
+                    <a:lumMod val="95000"/>
+                  </a:prstClr>
+                </a:solidFill>
+                <a:latin typeface="Arial" panose="020B0604020202020204" pitchFamily="34" charset="0"/>
+                <a:cs typeface="Arial" panose="020B0604020202020204" pitchFamily="34" charset="0"/>
+              </a:rPr>
+              <a:t>Ful</a:t>
+            </a:r>
+            <a:r>
+              <a:rPr lang="es-MX" sz="1600" dirty="0" smtClean="0">
+                <a:solidFill>
+                  <a:prstClr val="white">
+                    <a:lumMod val="95000"/>
+                  </a:prstClr>
+                </a:solidFill>
+                <a:latin typeface="Arial" panose="020B0604020202020204" pitchFamily="34" charset="0"/>
+                <a:cs typeface="Arial" panose="020B0604020202020204" pitchFamily="34" charset="0"/>
+              </a:rPr>
+              <a:t> Web </a:t>
+            </a:r>
+            <a:r>
+              <a:rPr lang="es-MX" sz="1600" dirty="0" smtClean="0">
+                <a:solidFill>
+                  <a:prstClr val="white">
+                    <a:lumMod val="95000"/>
+                  </a:prstClr>
+                </a:solidFill>
+                <a:latin typeface="Arial" panose="020B0604020202020204" pitchFamily="34" charset="0"/>
+                <a:cs typeface="Arial" panose="020B0604020202020204" pitchFamily="34" charset="0"/>
+              </a:rPr>
+              <a:t>Services</a:t>
+            </a:r>
+            <a:r>
+              <a:rPr lang="es-MX" sz="1600" dirty="0" smtClean="0">
+                <a:solidFill>
+                  <a:prstClr val="white">
+                    <a:lumMod val="95000"/>
+                  </a:prstClr>
+                </a:solidFill>
+                <a:latin typeface="Arial" panose="020B0604020202020204" pitchFamily="34" charset="0"/>
+                <a:cs typeface="Arial" panose="020B0604020202020204" pitchFamily="34" charset="0"/>
+              </a:rPr>
+              <a:t>)</a:t>
+            </a:r>
+            <a:endParaRPr lang="es-MX" sz="1600" dirty="0">
+              <a:solidFill>
+                <a:prstClr val="white">
+                  <a:lumMod val="95000"/>
+                </a:prstClr>
+              </a:solidFill>
+              <a:latin typeface="Arial" panose="020B0604020202020204" pitchFamily="34" charset="0"/>
+              <a:cs typeface="Arial" panose="020B0604020202020204" pitchFamily="34" charset="0"/>
+            </a:endParaRPr>
+          </a:p>
+          <a:p>
+            <a:pPr marL="342900" indent="-342900" algn="just">
+              <a:lnSpc>
+                <a:spcPct val="150000"/>
+              </a:lnSpc>
+              <a:buAutoNum type="arabicPeriod" startAt="3"/>
+            </a:pPr>
             <a:endParaRPr lang="es-MX" sz="1600" dirty="0" smtClean="0">
               <a:solidFill>
                 <a:prstClr val="white">
@@ -8002,70 +8221,20 @@
             </a:endParaRPr>
           </a:p>
           <a:p>
-            <a:pPr marL="342900" indent="-342900" algn="just">
+            <a:pPr algn="just">
               <a:lnSpc>
                 <a:spcPct val="150000"/>
               </a:lnSpc>
-              <a:buFont typeface="+mj-lt"/>
-              <a:buAutoNum type="arabicPeriod"/>
             </a:pPr>
-            <a:r>
-              <a:rPr lang="es-MX" sz="1600" dirty="0" smtClean="0">
-                <a:solidFill>
-                  <a:prstClr val="white">
-                    <a:lumMod val="95000"/>
-                  </a:prstClr>
-                </a:solidFill>
-                <a:latin typeface="Arial" panose="020B0604020202020204" pitchFamily="34" charset="0"/>
-                <a:cs typeface="Arial" panose="020B0604020202020204" pitchFamily="34" charset="0"/>
-              </a:rPr>
-              <a:t>Creación de una red neuronal Clásica</a:t>
-            </a:r>
-          </a:p>
-          <a:p>
-            <a:pPr marL="342900" indent="-342900" algn="just">
-              <a:lnSpc>
-                <a:spcPct val="150000"/>
-              </a:lnSpc>
-              <a:buFont typeface="+mj-lt"/>
-              <a:buAutoNum type="arabicPeriod"/>
-            </a:pPr>
-            <a:r>
-              <a:rPr lang="es-MX" sz="1600" dirty="0" smtClean="0">
-                <a:solidFill>
-                  <a:prstClr val="white">
-                    <a:lumMod val="95000"/>
-                  </a:prstClr>
-                </a:solidFill>
-                <a:latin typeface="Arial" panose="020B0604020202020204" pitchFamily="34" charset="0"/>
-                <a:cs typeface="Arial" panose="020B0604020202020204" pitchFamily="34" charset="0"/>
-              </a:rPr>
-              <a:t>Creación de una red neurona </a:t>
-            </a:r>
-            <a:r>
-              <a:rPr lang="es-MX" sz="1600" dirty="0" err="1" smtClean="0">
-                <a:solidFill>
-                  <a:prstClr val="white">
-                    <a:lumMod val="95000"/>
-                  </a:prstClr>
-                </a:solidFill>
-                <a:latin typeface="Arial" panose="020B0604020202020204" pitchFamily="34" charset="0"/>
-                <a:cs typeface="Arial" panose="020B0604020202020204" pitchFamily="34" charset="0"/>
-              </a:rPr>
-              <a:t>convulucional</a:t>
-            </a:r>
-            <a:r>
-              <a:rPr lang="es-MX" sz="1600" dirty="0" smtClean="0">
-                <a:solidFill>
-                  <a:prstClr val="white">
-                    <a:lumMod val="95000"/>
-                  </a:prstClr>
-                </a:solidFill>
-                <a:latin typeface="Arial" panose="020B0604020202020204" pitchFamily="34" charset="0"/>
-                <a:cs typeface="Arial" panose="020B0604020202020204" pitchFamily="34" charset="0"/>
-              </a:rPr>
-              <a:t> (Clasificador de imágenes)</a:t>
-            </a:r>
+            <a:endParaRPr lang="es-MX" sz="1600" dirty="0" smtClean="0">
+              <a:solidFill>
+                <a:prstClr val="white">
+                  <a:lumMod val="95000"/>
+                </a:prstClr>
+              </a:solidFill>
+              <a:latin typeface="Arial" panose="020B0604020202020204" pitchFamily="34" charset="0"/>
+              <a:cs typeface="Arial" panose="020B0604020202020204" pitchFamily="34" charset="0"/>
+            </a:endParaRPr>
           </a:p>
           <a:p>
             <a:pPr marL="342900" indent="-342900" algn="just">
@@ -8450,7 +8619,7 @@
         <p:spPr>
           <a:xfrm>
             <a:off x="597603" y="1686516"/>
-            <a:ext cx="9736568" cy="3610541"/>
+            <a:ext cx="9736568" cy="4175898"/>
           </a:xfrm>
           <a:prstGeom prst="rect">
             <a:avLst/>
@@ -8483,10 +8652,108 @@
           </a:lstStyle>
           <a:p>
             <a:r>
-              <a:rPr lang="es-MX"/>
-              <a:t>Spring Boot es un sub-proyecto de Spring Framework que busca facilitarnos la creación de proyectos con Spring Framework eliminando la necesidad de crear largos archivos de configuración XML. Estas configuraciones tediosas y propensas a errores ya no son necesarias debido a que Spring Boot provee configuraciones por defecto para la mayoría de las tecnologías usadas (Spring MVC, Spring Data JPA &amp; Hibernate, Spring Security, Spring REST, etc). Spring Boot nos ayuda a administrar todas las dependencias (archivos JAR y versiones compatibles). Spring Boot provee un modelo de programación parecido a las aplicaciones java tradicionales que se inician en el método main.</a:t>
+              <a:rPr lang="es-MX" dirty="0"/>
+              <a:t>Spring </a:t>
+            </a:r>
+            <a:r>
+              <a:rPr lang="es-MX" dirty="0" err="1"/>
+              <a:t>Boot</a:t>
+            </a:r>
+            <a:r>
+              <a:rPr lang="es-MX" dirty="0"/>
+              <a:t> es un sub-proyecto de Spring Framework que busca facilitarnos la creación de proyectos con Spring Framework eliminando la necesidad de crear largos archivos de configuración XML. </a:t>
             </a:r>
             <a:endParaRPr lang="es-MX" dirty="0"/>
+          </a:p>
+          <a:p>
+            <a:endParaRPr lang="es-MX" dirty="0"/>
+          </a:p>
+          <a:p>
+            <a:pPr marL="342900" indent="-342900">
+              <a:buFont typeface="Wingdings" panose="05000000000000000000" pitchFamily="2" charset="2"/>
+              <a:buChar char="Ø"/>
+            </a:pPr>
+            <a:r>
+              <a:rPr lang="es-MX" dirty="0" smtClean="0"/>
+              <a:t>Estas </a:t>
+            </a:r>
+            <a:r>
+              <a:rPr lang="es-MX" dirty="0"/>
+              <a:t>configuraciones tediosas y propensas a errores ya no son necesarias debido a que Spring </a:t>
+            </a:r>
+            <a:r>
+              <a:rPr lang="es-MX" dirty="0" err="1"/>
+              <a:t>Boot</a:t>
+            </a:r>
+            <a:r>
+              <a:rPr lang="es-MX" dirty="0"/>
+              <a:t> provee configuraciones por defecto para la mayoría de las tecnologías usadas (Spring MVC, Spring Data JPA &amp; </a:t>
+            </a:r>
+            <a:r>
+              <a:rPr lang="es-MX" dirty="0" err="1"/>
+              <a:t>Hibernate</a:t>
+            </a:r>
+            <a:r>
+              <a:rPr lang="es-MX" dirty="0"/>
+              <a:t>, Spring Security, Spring REST, </a:t>
+            </a:r>
+            <a:r>
+              <a:rPr lang="es-MX" dirty="0" err="1"/>
+              <a:t>etc</a:t>
+            </a:r>
+            <a:r>
+              <a:rPr lang="es-MX" dirty="0"/>
+              <a:t>). </a:t>
+            </a:r>
+            <a:endParaRPr lang="es-MX" dirty="0" smtClean="0"/>
+          </a:p>
+          <a:p>
+            <a:pPr marL="342900" indent="-342900">
+              <a:buFont typeface="Wingdings" panose="05000000000000000000" pitchFamily="2" charset="2"/>
+              <a:buChar char="Ø"/>
+            </a:pPr>
+            <a:r>
+              <a:rPr lang="es-MX" dirty="0" smtClean="0"/>
+              <a:t>Spring </a:t>
+            </a:r>
+            <a:r>
+              <a:rPr lang="es-MX" dirty="0" err="1"/>
+              <a:t>Boot</a:t>
+            </a:r>
+            <a:r>
+              <a:rPr lang="es-MX" dirty="0"/>
+              <a:t> nos ayuda a administrar todas las dependencias (archivos JAR y versiones compatibles</a:t>
+            </a:r>
+            <a:r>
+              <a:rPr lang="es-MX" dirty="0" smtClean="0"/>
+              <a:t>).</a:t>
+            </a:r>
+          </a:p>
+          <a:p>
+            <a:pPr marL="342900" indent="-342900">
+              <a:buFont typeface="Wingdings" panose="05000000000000000000" pitchFamily="2" charset="2"/>
+              <a:buChar char="Ø"/>
+            </a:pPr>
+            <a:r>
+              <a:rPr lang="es-MX" dirty="0" smtClean="0"/>
+              <a:t>Spring </a:t>
+            </a:r>
+            <a:r>
+              <a:rPr lang="es-MX" dirty="0" err="1"/>
+              <a:t>Boot</a:t>
+            </a:r>
+            <a:r>
+              <a:rPr lang="es-MX" dirty="0"/>
+              <a:t> provee un modelo de programación parecido a las aplicaciones java tradicionales que se inician en el método </a:t>
+            </a:r>
+            <a:r>
+              <a:rPr lang="es-MX" dirty="0" err="1"/>
+              <a:t>main</a:t>
+            </a:r>
+            <a:r>
+              <a:rPr lang="es-MX" dirty="0"/>
+              <a:t>.</a:t>
+            </a:r>
           </a:p>
         </p:txBody>
       </p:sp>
@@ -9169,12 +9436,8 @@
               <a:t>) y necesariamente tiene que contener un </a:t>
             </a:r>
             <a:r>
-              <a:rPr lang="es-MX" sz="900" dirty="0" err="1"/>
-              <a:t>metodo</a:t>
-            </a:r>
-            <a:r>
-              <a:rPr lang="es-MX" sz="900" dirty="0"/>
-              <a:t> </a:t>
+              <a:rPr lang="es-MX" sz="900" dirty="0" smtClean="0"/>
+              <a:t>método </a:t>
             </a:r>
             <a:r>
               <a:rPr lang="es-MX" sz="900" dirty="0" err="1"/>
@@ -9205,13 +9468,13 @@
   <p:clrMapOvr>
     <a:masterClrMapping/>
   </p:clrMapOvr>
-  <mc:AlternateContent xmlns:mc="http://schemas.openxmlformats.org/markup-compatibility/2006">
-    <mc:Choice xmlns:p14="http://schemas.microsoft.com/office/powerpoint/2010/main" Requires="p14">
+  <mc:AlternateContent xmlns:mc="http://schemas.openxmlformats.org/markup-compatibility/2006" xmlns:p14="http://schemas.microsoft.com/office/powerpoint/2010/main">
+    <mc:Choice Requires="p14">
       <p:transition spd="slow" p14:dur="1500">
         <p:random/>
       </p:transition>
     </mc:Choice>
-    <mc:Fallback>
+    <mc:Fallback xmlns="">
       <p:transition spd="slow">
         <p:random/>
       </p:transition>
@@ -9385,11 +9648,7 @@
           <a:p>
             <a:r>
               <a:rPr lang="es-MX" dirty="0" smtClean="0"/>
-              <a:t>Instalación</a:t>
-            </a:r>
-            <a:r>
-              <a:rPr lang="es-MX" dirty="0" smtClean="0"/>
-              <a:t> de JDK de java 1.8</a:t>
+              <a:t>Instalación de JDK de java 1.8</a:t>
             </a:r>
             <a:endParaRPr lang="es-MX" dirty="0"/>
           </a:p>
@@ -9546,13 +9805,13 @@
   <p:clrMapOvr>
     <a:masterClrMapping/>
   </p:clrMapOvr>
-  <mc:AlternateContent xmlns:mc="http://schemas.openxmlformats.org/markup-compatibility/2006">
-    <mc:Choice xmlns:p14="http://schemas.microsoft.com/office/powerpoint/2010/main" Requires="p14">
+  <mc:AlternateContent xmlns:mc="http://schemas.openxmlformats.org/markup-compatibility/2006" xmlns:p14="http://schemas.microsoft.com/office/powerpoint/2010/main">
+    <mc:Choice Requires="p14">
       <p:transition spd="slow" p14:dur="1500">
         <p:random/>
       </p:transition>
     </mc:Choice>
-    <mc:Fallback>
+    <mc:Fallback xmlns="">
       <p:transition spd="slow">
         <p:random/>
       </p:transition>
@@ -9885,13 +10144,13 @@
   <p:clrMapOvr>
     <a:masterClrMapping/>
   </p:clrMapOvr>
-  <mc:AlternateContent xmlns:mc="http://schemas.openxmlformats.org/markup-compatibility/2006">
-    <mc:Choice xmlns:p14="http://schemas.microsoft.com/office/powerpoint/2010/main" Requires="p14">
+  <mc:AlternateContent xmlns:mc="http://schemas.openxmlformats.org/markup-compatibility/2006" xmlns:p14="http://schemas.microsoft.com/office/powerpoint/2010/main">
+    <mc:Choice Requires="p14">
       <p:transition spd="slow" p14:dur="1500">
         <p:random/>
       </p:transition>
     </mc:Choice>
-    <mc:Fallback>
+    <mc:Fallback xmlns="">
       <p:transition spd="slow">
         <p:random/>
       </p:transition>
@@ -10257,13 +10516,13 @@
   <p:clrMapOvr>
     <a:masterClrMapping/>
   </p:clrMapOvr>
-  <mc:AlternateContent xmlns:mc="http://schemas.openxmlformats.org/markup-compatibility/2006">
-    <mc:Choice xmlns:p14="http://schemas.microsoft.com/office/powerpoint/2010/main" Requires="p14">
+  <mc:AlternateContent xmlns:mc="http://schemas.openxmlformats.org/markup-compatibility/2006" xmlns:p14="http://schemas.microsoft.com/office/powerpoint/2010/main">
+    <mc:Choice Requires="p14">
       <p:transition spd="slow" p14:dur="1500">
         <p:random/>
       </p:transition>
     </mc:Choice>
-    <mc:Fallback>
+    <mc:Fallback xmlns="">
       <p:transition spd="slow">
         <p:random/>
       </p:transition>
@@ -11337,57 +11596,6 @@
               </a:rPr>
               <a:t></a:t>
             </a:r>
-          </a:p>
-        </p:txBody>
-      </p:sp>
-      <p:sp>
-        <p:nvSpPr>
-          <p:cNvPr id="53" name="TextBox 52"/>
-          <p:cNvSpPr txBox="1"/>
-          <p:nvPr/>
-        </p:nvSpPr>
-        <p:spPr>
-          <a:xfrm>
-            <a:off x="1828975" y="5748220"/>
-            <a:ext cx="1645651" cy="138499"/>
-          </a:xfrm>
-          <a:prstGeom prst="rect">
-            <a:avLst/>
-          </a:prstGeom>
-          <a:noFill/>
-        </p:spPr>
-        <p:txBody>
-          <a:bodyPr wrap="square" lIns="0" tIns="0" rIns="0" bIns="0" rtlCol="0" anchor="t" anchorCtr="0">
-            <a:spAutoFit/>
-          </a:bodyPr>
-          <a:lstStyle/>
-          <a:p>
-            <a:pPr lvl="0"/>
-            <a:r>
-              <a:rPr lang="es-MX" sz="900" dirty="0">
-                <a:solidFill>
-                  <a:srgbClr val="44546A">
-                    <a:lumMod val="20000"/>
-                    <a:lumOff val="80000"/>
-                  </a:srgbClr>
-                </a:solidFill>
-                <a:latin typeface="+mj-lt"/>
-                <a:ea typeface="Adobe Fangsong Std R" panose="02020400000000000000" pitchFamily="18" charset="-128"/>
-                <a:cs typeface="Arial" panose="020B0604020202020204" pitchFamily="34" charset="0"/>
-              </a:rPr>
-              <a:t>www.linkedin.com/in/dsierra74</a:t>
-            </a:r>
-            <a:endParaRPr lang="en-IN" sz="900" dirty="0">
-              <a:solidFill>
-                <a:srgbClr val="44546A">
-                  <a:lumMod val="20000"/>
-                  <a:lumOff val="80000"/>
-                </a:srgbClr>
-              </a:solidFill>
-              <a:latin typeface="+mj-lt"/>
-              <a:ea typeface="Adobe Fangsong Std R" panose="02020400000000000000" pitchFamily="18" charset="-128"/>
-              <a:cs typeface="Arial" panose="020B0604020202020204" pitchFamily="34" charset="0"/>
-            </a:endParaRPr>
           </a:p>
         </p:txBody>
       </p:sp>
@@ -11851,60 +12059,14 @@
                                 </p:cTn>
                               </p:par>
                               <p:par>
-                                <p:cTn id="29" presetID="22" presetClass="entr" presetSubtype="1" fill="hold" grpId="0" nodeType="withEffect">
-                                  <p:stCondLst>
-                                    <p:cond delay="0"/>
-                                  </p:stCondLst>
-                                  <p:iterate type="wd">
-                                    <p:tmPct val="10000"/>
-                                  </p:iterate>
-                                  <p:childTnLst>
-                                    <p:set>
-                                      <p:cBhvr>
-                                        <p:cTn id="30" dur="1" fill="hold">
-                                          <p:stCondLst>
-                                            <p:cond delay="0"/>
-                                          </p:stCondLst>
-                                        </p:cTn>
-                                        <p:tgtEl>
-                                          <p:spTgt spid="53">
-                                            <p:txEl>
-                                              <p:pRg st="0" end="0"/>
-                                            </p:txEl>
-                                          </p:spTgt>
-                                        </p:tgtEl>
-                                        <p:attrNameLst>
-                                          <p:attrName>style.visibility</p:attrName>
-                                        </p:attrNameLst>
-                                      </p:cBhvr>
-                                      <p:to>
-                                        <p:strVal val="visible"/>
-                                      </p:to>
-                                    </p:set>
-                                    <p:animEffect transition="in" filter="wipe(up)">
-                                      <p:cBhvr>
-                                        <p:cTn id="31" dur="1000"/>
-                                        <p:tgtEl>
-                                          <p:spTgt spid="53">
-                                            <p:txEl>
-                                              <p:pRg st="0" end="0"/>
-                                            </p:txEl>
-                                          </p:spTgt>
-                                        </p:tgtEl>
-                                      </p:cBhvr>
-                                    </p:animEffect>
-                                  </p:childTnLst>
-                                </p:cTn>
-                              </p:par>
-                              <p:par>
-                                <p:cTn id="32" presetID="12" presetClass="entr" presetSubtype="1" fill="hold" grpId="0" nodeType="withEffect">
+                                <p:cTn id="29" presetID="12" presetClass="entr" presetSubtype="1" fill="hold" grpId="0" nodeType="withEffect">
                                   <p:stCondLst>
                                     <p:cond delay="500"/>
                                   </p:stCondLst>
                                   <p:childTnLst>
                                     <p:set>
                                       <p:cBhvr>
-                                        <p:cTn id="33" dur="1" fill="hold">
+                                        <p:cTn id="30" dur="1" fill="hold">
                                           <p:stCondLst>
                                             <p:cond delay="0"/>
                                           </p:stCondLst>
@@ -11922,7 +12084,7 @@
                                     </p:set>
                                     <p:anim calcmode="lin" valueType="num">
                                       <p:cBhvr additive="base">
-                                        <p:cTn id="34" dur="1000"/>
+                                        <p:cTn id="31" dur="1000"/>
                                         <p:tgtEl>
                                           <p:spTgt spid="34"/>
                                         </p:tgtEl>
@@ -11945,7 +12107,7 @@
                                     </p:anim>
                                     <p:animEffect transition="in" filter="wipe(down)">
                                       <p:cBhvr>
-                                        <p:cTn id="35" dur="1000"/>
+                                        <p:cTn id="32" dur="1000"/>
                                         <p:tgtEl>
                                           <p:spTgt spid="34"/>
                                         </p:tgtEl>
@@ -11955,14 +12117,14 @@
                                 </p:cTn>
                               </p:par>
                               <p:par>
-                                <p:cTn id="36" presetID="12" presetClass="entr" presetSubtype="1" fill="hold" grpId="0" nodeType="withEffect">
+                                <p:cTn id="33" presetID="12" presetClass="entr" presetSubtype="1" fill="hold" grpId="0" nodeType="withEffect">
                                   <p:stCondLst>
                                     <p:cond delay="500"/>
                                   </p:stCondLst>
                                   <p:childTnLst>
                                     <p:set>
                                       <p:cBhvr>
-                                        <p:cTn id="37" dur="1" fill="hold">
+                                        <p:cTn id="34" dur="1" fill="hold">
                                           <p:stCondLst>
                                             <p:cond delay="0"/>
                                           </p:stCondLst>
@@ -11980,7 +12142,7 @@
                                     </p:set>
                                     <p:anim calcmode="lin" valueType="num">
                                       <p:cBhvr additive="base">
-                                        <p:cTn id="38" dur="1000"/>
+                                        <p:cTn id="35" dur="1000"/>
                                         <p:tgtEl>
                                           <p:spTgt spid="35"/>
                                         </p:tgtEl>
@@ -12003,7 +12165,7 @@
                                     </p:anim>
                                     <p:animEffect transition="in" filter="wipe(down)">
                                       <p:cBhvr>
-                                        <p:cTn id="39" dur="1000"/>
+                                        <p:cTn id="36" dur="1000"/>
                                         <p:tgtEl>
                                           <p:spTgt spid="35"/>
                                         </p:tgtEl>
@@ -12013,14 +12175,14 @@
                                 </p:cTn>
                               </p:par>
                               <p:par>
-                                <p:cTn id="40" presetID="12" presetClass="entr" presetSubtype="1" fill="hold" grpId="0" nodeType="withEffect">
+                                <p:cTn id="37" presetID="12" presetClass="entr" presetSubtype="1" fill="hold" grpId="0" nodeType="withEffect">
                                   <p:stCondLst>
                                     <p:cond delay="500"/>
                                   </p:stCondLst>
                                   <p:childTnLst>
                                     <p:set>
                                       <p:cBhvr>
-                                        <p:cTn id="41" dur="1" fill="hold">
+                                        <p:cTn id="38" dur="1" fill="hold">
                                           <p:stCondLst>
                                             <p:cond delay="0"/>
                                           </p:stCondLst>
@@ -12038,7 +12200,7 @@
                                     </p:set>
                                     <p:anim calcmode="lin" valueType="num">
                                       <p:cBhvr additive="base">
-                                        <p:cTn id="42" dur="1000"/>
+                                        <p:cTn id="39" dur="1000"/>
                                         <p:tgtEl>
                                           <p:spTgt spid="36"/>
                                         </p:tgtEl>
@@ -12061,7 +12223,7 @@
                                     </p:anim>
                                     <p:animEffect transition="in" filter="wipe(down)">
                                       <p:cBhvr>
-                                        <p:cTn id="43" dur="1000"/>
+                                        <p:cTn id="40" dur="1000"/>
                                         <p:tgtEl>
                                           <p:spTgt spid="36"/>
                                         </p:tgtEl>
@@ -12071,14 +12233,14 @@
                                 </p:cTn>
                               </p:par>
                               <p:par>
-                                <p:cTn id="44" presetID="12" presetClass="entr" presetSubtype="1" fill="hold" nodeType="withEffect">
+                                <p:cTn id="41" presetID="12" presetClass="entr" presetSubtype="1" fill="hold" nodeType="withEffect">
                                   <p:stCondLst>
                                     <p:cond delay="500"/>
                                   </p:stCondLst>
                                   <p:childTnLst>
                                     <p:set>
                                       <p:cBhvr>
-                                        <p:cTn id="45" dur="1" fill="hold">
+                                        <p:cTn id="42" dur="1" fill="hold">
                                           <p:stCondLst>
                                             <p:cond delay="0"/>
                                           </p:stCondLst>
@@ -12096,7 +12258,7 @@
                                     </p:set>
                                     <p:anim calcmode="lin" valueType="num">
                                       <p:cBhvr additive="base">
-                                        <p:cTn id="46" dur="1000"/>
+                                        <p:cTn id="43" dur="1000"/>
                                         <p:tgtEl>
                                           <p:spTgt spid="37"/>
                                         </p:tgtEl>
@@ -12119,7 +12281,7 @@
                                     </p:anim>
                                     <p:animEffect transition="in" filter="wipe(down)">
                                       <p:cBhvr>
-                                        <p:cTn id="47" dur="1000"/>
+                                        <p:cTn id="44" dur="1000"/>
                                         <p:tgtEl>
                                           <p:spTgt spid="37"/>
                                         </p:tgtEl>
@@ -12129,14 +12291,14 @@
                                 </p:cTn>
                               </p:par>
                               <p:par>
-                                <p:cTn id="48" presetID="12" presetClass="entr" presetSubtype="1" fill="hold" nodeType="withEffect">
+                                <p:cTn id="45" presetID="12" presetClass="entr" presetSubtype="1" fill="hold" nodeType="withEffect">
                                   <p:stCondLst>
                                     <p:cond delay="500"/>
                                   </p:stCondLst>
                                   <p:childTnLst>
                                     <p:set>
                                       <p:cBhvr>
-                                        <p:cTn id="49" dur="1" fill="hold">
+                                        <p:cTn id="46" dur="1" fill="hold">
                                           <p:stCondLst>
                                             <p:cond delay="0"/>
                                           </p:stCondLst>
@@ -12154,7 +12316,7 @@
                                     </p:set>
                                     <p:anim calcmode="lin" valueType="num">
                                       <p:cBhvr additive="base">
-                                        <p:cTn id="50" dur="1000"/>
+                                        <p:cTn id="47" dur="1000"/>
                                         <p:tgtEl>
                                           <p:spTgt spid="41"/>
                                         </p:tgtEl>
@@ -12177,7 +12339,7 @@
                                     </p:anim>
                                     <p:animEffect transition="in" filter="wipe(down)">
                                       <p:cBhvr>
-                                        <p:cTn id="51" dur="1000"/>
+                                        <p:cTn id="48" dur="1000"/>
                                         <p:tgtEl>
                                           <p:spTgt spid="41"/>
                                         </p:tgtEl>
@@ -12223,7 +12385,6 @@
       <p:bldP spid="48" grpId="0" build="p"/>
       <p:bldP spid="49" grpId="0" build="p"/>
       <p:bldP spid="52" grpId="0" build="p"/>
-      <p:bldP spid="53" grpId="0" build="p"/>
     </p:bldLst>
   </p:timing>
 </p:sld>

</xml_diff>